<commit_message>
added what we learn to pp
</commit_message>
<xml_diff>
--- a/MLflow_Overview.pptx
+++ b/MLflow_Overview.pptx
@@ -22,6 +22,9 @@
   </p:sldIdLst>
   <p:sldSz cx="12192000" cy="6858000"/>
   <p:notesSz cx="6858000" cy="9144000"/>
+  <p:custDataLst>
+    <p:tags r:id="rId17"/>
+  </p:custDataLst>
   <p:defaultTextStyle>
     <a:defPPr>
       <a:defRPr lang="de-DE"/>
@@ -217,7 +220,7 @@
           </a:lstStyle>
           <a:p>
             <a:fld id="{4C2F956B-2EA9-4372-93C0-AE8AC1C6D140}" type="datetimeFigureOut">
-              <a:t>19.07.23</a:t>
+              <a:t>13.08.23</a:t>
             </a:fld>
             <a:endParaRPr lang="en-US"/>
           </a:p>
@@ -1487,7 +1490,7 @@
           <a:p>
             <a:fld id="{D3EB3054-B75A-4BD7-8B3E-8DC0F614FAF3}" type="datetimeFigureOut">
               <a:rPr lang="de-DE" smtClean="0"/>
-              <a:t>19.07.23</a:t>
+              <a:t>13.08.23</a:t>
             </a:fld>
             <a:endParaRPr lang="de-DE"/>
           </a:p>
@@ -1655,7 +1658,7 @@
           <a:p>
             <a:fld id="{D3EB3054-B75A-4BD7-8B3E-8DC0F614FAF3}" type="datetimeFigureOut">
               <a:rPr lang="de-DE" smtClean="0"/>
-              <a:t>19.07.23</a:t>
+              <a:t>13.08.23</a:t>
             </a:fld>
             <a:endParaRPr lang="de-DE"/>
           </a:p>
@@ -1833,7 +1836,7 @@
           <a:p>
             <a:fld id="{D3EB3054-B75A-4BD7-8B3E-8DC0F614FAF3}" type="datetimeFigureOut">
               <a:rPr lang="de-DE" smtClean="0"/>
-              <a:t>19.07.23</a:t>
+              <a:t>13.08.23</a:t>
             </a:fld>
             <a:endParaRPr lang="de-DE"/>
           </a:p>
@@ -2101,7 +2104,7 @@
             <a:fld id="{A47DC638-6E46-49FF-A72E-B879FC48254A}" type="datetimeFigureOut">
               <a:rPr lang="de-DE"/>
               <a:pPr/>
-              <a:t>19.07.23</a:t>
+              <a:t>13.08.23</a:t>
             </a:fld>
             <a:endParaRPr lang="de-DE" dirty="0"/>
           </a:p>
@@ -2722,7 +2725,7 @@
             <a:fld id="{A47DC638-6E46-49FF-A72E-B879FC48254A}" type="datetimeFigureOut">
               <a:rPr lang="de-DE"/>
               <a:pPr/>
-              <a:t>19.07.23</a:t>
+              <a:t>13.08.23</a:t>
             </a:fld>
             <a:endParaRPr lang="de-DE"/>
           </a:p>
@@ -2935,7 +2938,7 @@
           <a:p>
             <a:fld id="{D3EB3054-B75A-4BD7-8B3E-8DC0F614FAF3}" type="datetimeFigureOut">
               <a:rPr lang="de-DE" smtClean="0"/>
-              <a:t>19.07.23</a:t>
+              <a:t>13.08.23</a:t>
             </a:fld>
             <a:endParaRPr lang="de-DE"/>
           </a:p>
@@ -3180,7 +3183,7 @@
           <a:p>
             <a:fld id="{D3EB3054-B75A-4BD7-8B3E-8DC0F614FAF3}" type="datetimeFigureOut">
               <a:rPr lang="de-DE" smtClean="0"/>
-              <a:t>19.07.23</a:t>
+              <a:t>13.08.23</a:t>
             </a:fld>
             <a:endParaRPr lang="de-DE"/>
           </a:p>
@@ -3409,7 +3412,7 @@
           <a:p>
             <a:fld id="{D3EB3054-B75A-4BD7-8B3E-8DC0F614FAF3}" type="datetimeFigureOut">
               <a:rPr lang="de-DE" smtClean="0"/>
-              <a:t>19.07.23</a:t>
+              <a:t>13.08.23</a:t>
             </a:fld>
             <a:endParaRPr lang="de-DE"/>
           </a:p>
@@ -3773,7 +3776,7 @@
           <a:p>
             <a:fld id="{D3EB3054-B75A-4BD7-8B3E-8DC0F614FAF3}" type="datetimeFigureOut">
               <a:rPr lang="de-DE" smtClean="0"/>
-              <a:t>19.07.23</a:t>
+              <a:t>13.08.23</a:t>
             </a:fld>
             <a:endParaRPr lang="de-DE"/>
           </a:p>
@@ -3890,7 +3893,7 @@
           <a:p>
             <a:fld id="{D3EB3054-B75A-4BD7-8B3E-8DC0F614FAF3}" type="datetimeFigureOut">
               <a:rPr lang="de-DE" smtClean="0"/>
-              <a:t>19.07.23</a:t>
+              <a:t>13.08.23</a:t>
             </a:fld>
             <a:endParaRPr lang="de-DE"/>
           </a:p>
@@ -3985,7 +3988,7 @@
           <a:p>
             <a:fld id="{D3EB3054-B75A-4BD7-8B3E-8DC0F614FAF3}" type="datetimeFigureOut">
               <a:rPr lang="de-DE" smtClean="0"/>
-              <a:t>19.07.23</a:t>
+              <a:t>13.08.23</a:t>
             </a:fld>
             <a:endParaRPr lang="de-DE"/>
           </a:p>
@@ -4260,7 +4263,7 @@
           <a:p>
             <a:fld id="{D3EB3054-B75A-4BD7-8B3E-8DC0F614FAF3}" type="datetimeFigureOut">
               <a:rPr lang="de-DE" smtClean="0"/>
-              <a:t>19.07.23</a:t>
+              <a:t>13.08.23</a:t>
             </a:fld>
             <a:endParaRPr lang="de-DE"/>
           </a:p>
@@ -4512,7 +4515,7 @@
           <a:p>
             <a:fld id="{D3EB3054-B75A-4BD7-8B3E-8DC0F614FAF3}" type="datetimeFigureOut">
               <a:rPr lang="de-DE" smtClean="0"/>
-              <a:t>19.07.23</a:t>
+              <a:t>13.08.23</a:t>
             </a:fld>
             <a:endParaRPr lang="de-DE"/>
           </a:p>
@@ -4723,7 +4726,7 @@
           <a:p>
             <a:fld id="{D3EB3054-B75A-4BD7-8B3E-8DC0F614FAF3}" type="datetimeFigureOut">
               <a:rPr lang="de-DE" smtClean="0"/>
-              <a:t>19.07.23</a:t>
+              <a:t>13.08.23</a:t>
             </a:fld>
             <a:endParaRPr lang="de-DE"/>
           </a:p>
@@ -5312,7 +5315,7 @@
             <a:fld id="{A47DC638-6E46-49FF-A72E-B879FC48254A}" type="datetimeFigureOut">
               <a:rPr lang="de-DE"/>
               <a:pPr/>
-              <a:t>19.07.23</a:t>
+              <a:t>13.08.23</a:t>
             </a:fld>
             <a:endParaRPr lang="de-DE" dirty="0"/>
           </a:p>
@@ -6094,7 +6097,7 @@
             <a:fld id="{A47DC638-6E46-49FF-A72E-B879FC48254A}" type="datetimeFigureOut">
               <a:rPr lang="en-US" smtClean="0"/>
               <a:pPr/>
-              <a:t>7/19/23</a:t>
+              <a:t>8/13/23</a:t>
             </a:fld>
             <a:endParaRPr lang="en-US"/>
           </a:p>
@@ -6683,8 +6686,8 @@
         </p:blipFill>
         <p:spPr>
           <a:xfrm>
-            <a:off x="1699026" y="1335050"/>
-            <a:ext cx="2614840" cy="971056"/>
+            <a:off x="1509838" y="1335050"/>
+            <a:ext cx="4343729" cy="1613102"/>
           </a:xfrm>
         </p:spPr>
       </p:pic>
@@ -6800,8 +6803,8 @@
         </p:nvSpPr>
         <p:spPr>
           <a:xfrm>
-            <a:off x="4631376" y="1335972"/>
-            <a:ext cx="4845691" cy="964880"/>
+            <a:off x="3870889" y="2948152"/>
+            <a:ext cx="7385690" cy="1125693"/>
           </a:xfrm>
           <a:prstGeom prst="rect">
             <a:avLst/>
@@ -6828,7 +6831,7 @@
               </a:spcAft>
             </a:pPr>
             <a:r>
-              <a:rPr lang="en-US" sz="6000" dirty="0">
+              <a:rPr lang="en-US" sz="5000" dirty="0">
                 <a:solidFill>
                   <a:srgbClr val="323232"/>
                 </a:solidFill>
@@ -6836,9 +6839,20 @@
                 <a:ea typeface="Cambria"/>
                 <a:cs typeface="Arial"/>
               </a:rPr>
-              <a:t>Training</a:t>
-            </a:r>
-            <a:endParaRPr lang="en-US" sz="6000">
+              <a:t>[at]-internal</a:t>
+            </a:r>
+            <a:r>
+              <a:rPr lang="en-US" sz="7000" dirty="0">
+                <a:solidFill>
+                  <a:srgbClr val="323232"/>
+                </a:solidFill>
+                <a:latin typeface="Calibri"/>
+                <a:ea typeface="Cambria"/>
+                <a:cs typeface="Arial"/>
+              </a:rPr>
+              <a:t> Training</a:t>
+            </a:r>
+            <a:endParaRPr lang="en-US" sz="7000" dirty="0">
               <a:solidFill>
                 <a:srgbClr val="323232"/>
               </a:solidFill>
@@ -7520,9 +7534,9 @@
         <p:grpSpPr>
           <a:xfrm>
             <a:off x="1769051" y="4443349"/>
-            <a:ext cx="3131234" cy="312330"/>
+            <a:ext cx="2291260" cy="312330"/>
             <a:chOff x="1818532" y="2414648"/>
-            <a:chExt cx="3131234" cy="312330"/>
+            <a:chExt cx="2291260" cy="312330"/>
           </a:xfrm>
         </p:grpSpPr>
         <p:pic>
@@ -7561,6 +7575,130 @@
               <a:extLst>
                 <a:ext uri="{FF2B5EF4-FFF2-40B4-BE49-F238E27FC236}">
                   <a16:creationId xmlns:a16="http://schemas.microsoft.com/office/drawing/2014/main" id="{B19CAD61-0255-5009-54F2-AD7B7D72962C}"/>
+                </a:ext>
+              </a:extLst>
+            </p:cNvPr>
+            <p:cNvSpPr txBox="1"/>
+            <p:nvPr/>
+          </p:nvSpPr>
+          <p:spPr>
+            <a:xfrm>
+              <a:off x="2384961" y="2414648"/>
+              <a:ext cx="1724831" cy="312330"/>
+            </a:xfrm>
+            <a:prstGeom prst="rect">
+              <a:avLst/>
+            </a:prstGeom>
+            <a:solidFill>
+              <a:schemeClr val="bg1"/>
+            </a:solidFill>
+          </p:spPr>
+          <p:txBody>
+            <a:bodyPr rot="0" spcFirstLastPara="0" vertOverflow="overflow" horzOverflow="overflow" vert="horz" wrap="none" lIns="0" tIns="0" rIns="0" bIns="0" numCol="1" spcCol="0" rtlCol="0" fromWordArt="0" anchor="t" anchorCtr="0" forceAA="0" compatLnSpc="1">
+              <a:prstTxWarp prst="textNoShape">
+                <a:avLst/>
+              </a:prstTxWarp>
+              <a:spAutoFit/>
+            </a:bodyPr>
+            <a:lstStyle/>
+            <a:p>
+              <a:pPr>
+                <a:lnSpc>
+                  <a:spcPct val="110000"/>
+                </a:lnSpc>
+                <a:spcAft>
+                  <a:spcPts val="200"/>
+                </a:spcAft>
+              </a:pPr>
+              <a:r>
+                <a:rPr lang="en-US" sz="2000" dirty="0" err="1">
+                  <a:solidFill>
+                    <a:schemeClr val="bg1">
+                      <a:lumMod val="50000"/>
+                    </a:schemeClr>
+                  </a:solidFill>
+                  <a:cs typeface="Arial"/>
+                </a:rPr>
+                <a:t>Mlflow</a:t>
+              </a:r>
+              <a:r>
+                <a:rPr lang="en-US" sz="2000" dirty="0">
+                  <a:solidFill>
+                    <a:schemeClr val="bg1">
+                      <a:lumMod val="50000"/>
+                    </a:schemeClr>
+                  </a:solidFill>
+                  <a:cs typeface="Arial"/>
+                </a:rPr>
+                <a:t> Projects</a:t>
+              </a:r>
+              <a:endParaRPr lang="en-US" dirty="0">
+                <a:solidFill>
+                  <a:schemeClr val="bg1">
+                    <a:lumMod val="50000"/>
+                  </a:schemeClr>
+                </a:solidFill>
+              </a:endParaRPr>
+            </a:p>
+          </p:txBody>
+        </p:sp>
+      </p:grpSp>
+      <p:grpSp>
+        <p:nvGrpSpPr>
+          <p:cNvPr id="2" name="Group 22">
+            <a:extLst>
+              <a:ext uri="{FF2B5EF4-FFF2-40B4-BE49-F238E27FC236}">
+                <a16:creationId xmlns:a16="http://schemas.microsoft.com/office/drawing/2014/main" id="{BD840CAA-FDD2-A17B-C30E-446C0A9F0123}"/>
+              </a:ext>
+            </a:extLst>
+          </p:cNvPr>
+          <p:cNvGrpSpPr/>
+          <p:nvPr/>
+        </p:nvGrpSpPr>
+        <p:grpSpPr>
+          <a:xfrm>
+            <a:off x="1769051" y="4928258"/>
+            <a:ext cx="3131234" cy="312330"/>
+            <a:chOff x="1818532" y="2414648"/>
+            <a:chExt cx="3131234" cy="312330"/>
+          </a:xfrm>
+        </p:grpSpPr>
+        <p:pic>
+          <p:nvPicPr>
+            <p:cNvPr id="7" name="Picture 6">
+              <a:extLst>
+                <a:ext uri="{FF2B5EF4-FFF2-40B4-BE49-F238E27FC236}">
+                  <a16:creationId xmlns:a16="http://schemas.microsoft.com/office/drawing/2014/main" id="{9A959C3E-3E18-2F5F-9515-B3C5D25A2ABE}"/>
+                </a:ext>
+              </a:extLst>
+            </p:cNvPr>
+            <p:cNvPicPr>
+              <a:picLocks noChangeAspect="1"/>
+            </p:cNvPicPr>
+            <p:nvPr/>
+          </p:nvPicPr>
+          <p:blipFill>
+            <a:blip r:embed="rId2"/>
+            <a:stretch>
+              <a:fillRect/>
+            </a:stretch>
+          </p:blipFill>
+          <p:spPr>
+            <a:xfrm>
+              <a:off x="1818532" y="2445822"/>
+              <a:ext cx="281792" cy="254330"/>
+            </a:xfrm>
+            <a:prstGeom prst="rect">
+              <a:avLst/>
+            </a:prstGeom>
+          </p:spPr>
+        </p:pic>
+        <p:sp>
+          <p:nvSpPr>
+            <p:cNvPr id="8" name="TextBox 24">
+              <a:extLst>
+                <a:ext uri="{FF2B5EF4-FFF2-40B4-BE49-F238E27FC236}">
+                  <a16:creationId xmlns:a16="http://schemas.microsoft.com/office/drawing/2014/main" id="{0F922FD0-6238-93F0-9A04-485A65391B45}"/>
                 </a:ext>
               </a:extLst>
             </p:cNvPr>
@@ -9513,35 +9651,462 @@
           </a:p>
         </p:txBody>
       </p:sp>
-      <p:sp>
-        <p:nvSpPr>
-          <p:cNvPr id="6" name="Inhaltsplatzhalter 5">
+      <p:grpSp>
+        <p:nvGrpSpPr>
+          <p:cNvPr id="8" name="Group 8">
             <a:extLst>
               <a:ext uri="{FF2B5EF4-FFF2-40B4-BE49-F238E27FC236}">
-                <a16:creationId xmlns:a16="http://schemas.microsoft.com/office/drawing/2014/main" id="{8736EEDD-9782-88C5-A43F-9A1A413CE9B9}"/>
+                <a16:creationId xmlns:a16="http://schemas.microsoft.com/office/drawing/2014/main" id="{400B93DC-5D16-B86D-6DAF-19A812B8A328}"/>
               </a:ext>
             </a:extLst>
           </p:cNvPr>
-          <p:cNvSpPr>
-            <a:spLocks noGrp="1"/>
-          </p:cNvSpPr>
-          <p:nvPr>
-            <p:ph idx="1"/>
-          </p:nvPr>
-        </p:nvSpPr>
-        <p:spPr/>
-        <p:txBody>
-          <a:bodyPr/>
-          <a:lstStyle/>
-          <a:p>
-            <a:r>
-              <a:rPr lang="de-DE"/>
-              <a:t>Dies das</a:t>
-            </a:r>
-            <a:endParaRPr lang="de-DE" dirty="0"/>
-          </a:p>
-        </p:txBody>
-      </p:sp>
+          <p:cNvGrpSpPr/>
+          <p:nvPr/>
+        </p:nvGrpSpPr>
+        <p:grpSpPr>
+          <a:xfrm>
+            <a:off x="1769051" y="2430284"/>
+            <a:ext cx="7844062" cy="312330"/>
+            <a:chOff x="1818532" y="2414648"/>
+            <a:chExt cx="7844062" cy="312330"/>
+          </a:xfrm>
+        </p:grpSpPr>
+        <p:pic>
+          <p:nvPicPr>
+            <p:cNvPr id="9" name="Picture 6">
+              <a:extLst>
+                <a:ext uri="{FF2B5EF4-FFF2-40B4-BE49-F238E27FC236}">
+                  <a16:creationId xmlns:a16="http://schemas.microsoft.com/office/drawing/2014/main" id="{D3D8AB6E-6D30-AEC7-5E81-55694D995F58}"/>
+                </a:ext>
+              </a:extLst>
+            </p:cNvPr>
+            <p:cNvPicPr>
+              <a:picLocks noChangeAspect="1"/>
+            </p:cNvPicPr>
+            <p:nvPr/>
+          </p:nvPicPr>
+          <p:blipFill>
+            <a:blip r:embed="rId3"/>
+            <a:stretch>
+              <a:fillRect/>
+            </a:stretch>
+          </p:blipFill>
+          <p:spPr>
+            <a:xfrm>
+              <a:off x="1818532" y="2445822"/>
+              <a:ext cx="281792" cy="254330"/>
+            </a:xfrm>
+            <a:prstGeom prst="rect">
+              <a:avLst/>
+            </a:prstGeom>
+          </p:spPr>
+        </p:pic>
+        <p:sp>
+          <p:nvSpPr>
+            <p:cNvPr id="10" name="TextBox 7">
+              <a:extLst>
+                <a:ext uri="{FF2B5EF4-FFF2-40B4-BE49-F238E27FC236}">
+                  <a16:creationId xmlns:a16="http://schemas.microsoft.com/office/drawing/2014/main" id="{9CB0DB14-071A-4CDD-62A7-BAB89340A2C7}"/>
+                </a:ext>
+              </a:extLst>
+            </p:cNvPr>
+            <p:cNvSpPr txBox="1"/>
+            <p:nvPr/>
+          </p:nvSpPr>
+          <p:spPr>
+            <a:xfrm>
+              <a:off x="2384961" y="2414648"/>
+              <a:ext cx="7277633" cy="312330"/>
+            </a:xfrm>
+            <a:prstGeom prst="rect">
+              <a:avLst/>
+            </a:prstGeom>
+            <a:solidFill>
+              <a:schemeClr val="bg1"/>
+            </a:solidFill>
+          </p:spPr>
+          <p:txBody>
+            <a:bodyPr rot="0" spcFirstLastPara="0" vertOverflow="overflow" horzOverflow="overflow" vert="horz" wrap="none" lIns="0" tIns="0" rIns="0" bIns="0" numCol="1" spcCol="0" rtlCol="0" fromWordArt="0" anchor="t" anchorCtr="0" forceAA="0" compatLnSpc="1">
+              <a:prstTxWarp prst="textNoShape">
+                <a:avLst/>
+              </a:prstTxWarp>
+              <a:spAutoFit/>
+            </a:bodyPr>
+            <a:lstStyle/>
+            <a:p>
+              <a:pPr>
+                <a:lnSpc>
+                  <a:spcPct val="110000"/>
+                </a:lnSpc>
+                <a:spcAft>
+                  <a:spcPts val="200"/>
+                </a:spcAft>
+              </a:pPr>
+              <a:r>
+                <a:rPr lang="en-US" sz="2000" dirty="0">
+                  <a:solidFill>
+                    <a:schemeClr val="bg1">
+                      <a:lumMod val="50000"/>
+                    </a:schemeClr>
+                  </a:solidFill>
+                  <a:ea typeface="+mn-lt"/>
+                  <a:cs typeface="+mn-lt"/>
+                </a:rPr>
+                <a:t>How to log model parameters and metrics in a distributable way </a:t>
+              </a:r>
+              <a:endParaRPr lang="en-US" sz="2000" dirty="0">
+                <a:solidFill>
+                  <a:schemeClr val="bg1">
+                    <a:lumMod val="50000"/>
+                  </a:schemeClr>
+                </a:solidFill>
+                <a:cs typeface="Arial"/>
+              </a:endParaRPr>
+            </a:p>
+          </p:txBody>
+        </p:sp>
+      </p:grpSp>
+      <p:grpSp>
+        <p:nvGrpSpPr>
+          <p:cNvPr id="11" name="Group 12">
+            <a:extLst>
+              <a:ext uri="{FF2B5EF4-FFF2-40B4-BE49-F238E27FC236}">
+                <a16:creationId xmlns:a16="http://schemas.microsoft.com/office/drawing/2014/main" id="{1810D793-697F-3DA7-D659-EFF57279C8B5}"/>
+              </a:ext>
+            </a:extLst>
+          </p:cNvPr>
+          <p:cNvGrpSpPr/>
+          <p:nvPr/>
+        </p:nvGrpSpPr>
+        <p:grpSpPr>
+          <a:xfrm>
+            <a:off x="1769051" y="3016514"/>
+            <a:ext cx="6749212" cy="312330"/>
+            <a:chOff x="1818532" y="2414648"/>
+            <a:chExt cx="6749212" cy="312330"/>
+          </a:xfrm>
+        </p:grpSpPr>
+        <p:pic>
+          <p:nvPicPr>
+            <p:cNvPr id="12" name="Picture 6">
+              <a:extLst>
+                <a:ext uri="{FF2B5EF4-FFF2-40B4-BE49-F238E27FC236}">
+                  <a16:creationId xmlns:a16="http://schemas.microsoft.com/office/drawing/2014/main" id="{96FA47D3-B05D-D1C1-4088-059D65FC6D11}"/>
+                </a:ext>
+              </a:extLst>
+            </p:cNvPr>
+            <p:cNvPicPr>
+              <a:picLocks noChangeAspect="1"/>
+            </p:cNvPicPr>
+            <p:nvPr/>
+          </p:nvPicPr>
+          <p:blipFill>
+            <a:blip r:embed="rId3"/>
+            <a:stretch>
+              <a:fillRect/>
+            </a:stretch>
+          </p:blipFill>
+          <p:spPr>
+            <a:xfrm>
+              <a:off x="1818532" y="2445822"/>
+              <a:ext cx="281792" cy="254330"/>
+            </a:xfrm>
+            <a:prstGeom prst="rect">
+              <a:avLst/>
+            </a:prstGeom>
+          </p:spPr>
+        </p:pic>
+        <p:sp>
+          <p:nvSpPr>
+            <p:cNvPr id="13" name="TextBox 11">
+              <a:extLst>
+                <a:ext uri="{FF2B5EF4-FFF2-40B4-BE49-F238E27FC236}">
+                  <a16:creationId xmlns:a16="http://schemas.microsoft.com/office/drawing/2014/main" id="{410B98F4-0D23-AA95-6940-94FEBDB12BBA}"/>
+                </a:ext>
+              </a:extLst>
+            </p:cNvPr>
+            <p:cNvSpPr txBox="1"/>
+            <p:nvPr/>
+          </p:nvSpPr>
+          <p:spPr>
+            <a:xfrm>
+              <a:off x="2384961" y="2414648"/>
+              <a:ext cx="6182783" cy="312330"/>
+            </a:xfrm>
+            <a:prstGeom prst="rect">
+              <a:avLst/>
+            </a:prstGeom>
+            <a:solidFill>
+              <a:schemeClr val="bg1"/>
+            </a:solidFill>
+          </p:spPr>
+          <p:txBody>
+            <a:bodyPr rot="0" spcFirstLastPara="0" vertOverflow="overflow" horzOverflow="overflow" vert="horz" wrap="none" lIns="0" tIns="0" rIns="0" bIns="0" numCol="1" spcCol="0" rtlCol="0" fromWordArt="0" anchor="t" anchorCtr="0" forceAA="0" compatLnSpc="1">
+              <a:prstTxWarp prst="textNoShape">
+                <a:avLst/>
+              </a:prstTxWarp>
+              <a:spAutoFit/>
+            </a:bodyPr>
+            <a:lstStyle/>
+            <a:p>
+              <a:pPr>
+                <a:lnSpc>
+                  <a:spcPct val="110000"/>
+                </a:lnSpc>
+                <a:spcAft>
+                  <a:spcPts val="200"/>
+                </a:spcAft>
+              </a:pPr>
+              <a:r>
+                <a:rPr lang="en-US" sz="2000" dirty="0">
+                  <a:solidFill>
+                    <a:schemeClr val="bg1">
+                      <a:lumMod val="50000"/>
+                    </a:schemeClr>
+                  </a:solidFill>
+                  <a:cs typeface="Arial"/>
+                </a:rPr>
+                <a:t>How to save and load models so they are reproducible</a:t>
+              </a:r>
+              <a:endParaRPr lang="en-US" dirty="0">
+                <a:solidFill>
+                  <a:schemeClr val="bg1">
+                    <a:lumMod val="50000"/>
+                  </a:schemeClr>
+                </a:solidFill>
+              </a:endParaRPr>
+            </a:p>
+          </p:txBody>
+        </p:sp>
+      </p:grpSp>
+      <p:grpSp>
+        <p:nvGrpSpPr>
+          <p:cNvPr id="14" name="Group 17">
+            <a:extLst>
+              <a:ext uri="{FF2B5EF4-FFF2-40B4-BE49-F238E27FC236}">
+                <a16:creationId xmlns:a16="http://schemas.microsoft.com/office/drawing/2014/main" id="{4AD450E6-792C-74D0-BB8B-95F9B2B2C022}"/>
+              </a:ext>
+            </a:extLst>
+          </p:cNvPr>
+          <p:cNvGrpSpPr/>
+          <p:nvPr/>
+        </p:nvGrpSpPr>
+        <p:grpSpPr>
+          <a:xfrm>
+            <a:off x="1769051" y="3633918"/>
+            <a:ext cx="7618039" cy="312330"/>
+            <a:chOff x="1818532" y="2414648"/>
+            <a:chExt cx="7618039" cy="312330"/>
+          </a:xfrm>
+        </p:grpSpPr>
+        <p:pic>
+          <p:nvPicPr>
+            <p:cNvPr id="15" name="Picture 6">
+              <a:extLst>
+                <a:ext uri="{FF2B5EF4-FFF2-40B4-BE49-F238E27FC236}">
+                  <a16:creationId xmlns:a16="http://schemas.microsoft.com/office/drawing/2014/main" id="{A3999F9A-A5F3-3F51-B6D0-50F8CD5A309C}"/>
+                </a:ext>
+              </a:extLst>
+            </p:cNvPr>
+            <p:cNvPicPr>
+              <a:picLocks noChangeAspect="1"/>
+            </p:cNvPicPr>
+            <p:nvPr/>
+          </p:nvPicPr>
+          <p:blipFill>
+            <a:blip r:embed="rId3"/>
+            <a:stretch>
+              <a:fillRect/>
+            </a:stretch>
+          </p:blipFill>
+          <p:spPr>
+            <a:xfrm>
+              <a:off x="1818532" y="2445822"/>
+              <a:ext cx="281792" cy="254330"/>
+            </a:xfrm>
+            <a:prstGeom prst="rect">
+              <a:avLst/>
+            </a:prstGeom>
+          </p:spPr>
+        </p:pic>
+        <p:sp>
+          <p:nvSpPr>
+            <p:cNvPr id="16" name="TextBox 16">
+              <a:extLst>
+                <a:ext uri="{FF2B5EF4-FFF2-40B4-BE49-F238E27FC236}">
+                  <a16:creationId xmlns:a16="http://schemas.microsoft.com/office/drawing/2014/main" id="{B902CF59-C987-C2BE-DF9C-39F1839EF1CA}"/>
+                </a:ext>
+              </a:extLst>
+            </p:cNvPr>
+            <p:cNvSpPr txBox="1"/>
+            <p:nvPr/>
+          </p:nvSpPr>
+          <p:spPr>
+            <a:xfrm>
+              <a:off x="2384961" y="2414648"/>
+              <a:ext cx="7051610" cy="312330"/>
+            </a:xfrm>
+            <a:prstGeom prst="rect">
+              <a:avLst/>
+            </a:prstGeom>
+            <a:solidFill>
+              <a:schemeClr val="bg1"/>
+            </a:solidFill>
+          </p:spPr>
+          <p:txBody>
+            <a:bodyPr rot="0" spcFirstLastPara="0" vertOverflow="overflow" horzOverflow="overflow" vert="horz" wrap="none" lIns="0" tIns="0" rIns="0" bIns="0" numCol="1" spcCol="0" rtlCol="0" fromWordArt="0" anchor="t" anchorCtr="0" forceAA="0" compatLnSpc="1">
+              <a:prstTxWarp prst="textNoShape">
+                <a:avLst/>
+              </a:prstTxWarp>
+              <a:spAutoFit/>
+            </a:bodyPr>
+            <a:lstStyle/>
+            <a:p>
+              <a:pPr>
+                <a:lnSpc>
+                  <a:spcPct val="110000"/>
+                </a:lnSpc>
+                <a:spcAft>
+                  <a:spcPts val="200"/>
+                </a:spcAft>
+              </a:pPr>
+              <a:r>
+                <a:rPr lang="en-US" sz="2000" dirty="0">
+                  <a:solidFill>
+                    <a:schemeClr val="bg1">
+                      <a:lumMod val="50000"/>
+                    </a:schemeClr>
+                  </a:solidFill>
+                  <a:cs typeface="Arial"/>
+                </a:rPr>
+                <a:t>Run machine learning code within a reusable standard format </a:t>
+              </a:r>
+              <a:endParaRPr lang="en-US" dirty="0">
+                <a:solidFill>
+                  <a:schemeClr val="bg1">
+                    <a:lumMod val="50000"/>
+                  </a:schemeClr>
+                </a:solidFill>
+              </a:endParaRPr>
+            </a:p>
+          </p:txBody>
+        </p:sp>
+      </p:grpSp>
+      <p:grpSp>
+        <p:nvGrpSpPr>
+          <p:cNvPr id="17" name="Group 21">
+            <a:extLst>
+              <a:ext uri="{FF2B5EF4-FFF2-40B4-BE49-F238E27FC236}">
+                <a16:creationId xmlns:a16="http://schemas.microsoft.com/office/drawing/2014/main" id="{F2EEBEEF-4F72-06E7-2F49-7A3961D9A1BE}"/>
+              </a:ext>
+            </a:extLst>
+          </p:cNvPr>
+          <p:cNvGrpSpPr/>
+          <p:nvPr/>
+        </p:nvGrpSpPr>
+        <p:grpSpPr>
+          <a:xfrm>
+            <a:off x="1769051" y="4287240"/>
+            <a:ext cx="6762036" cy="312330"/>
+            <a:chOff x="1818532" y="2414648"/>
+            <a:chExt cx="6762036" cy="312330"/>
+          </a:xfrm>
+        </p:grpSpPr>
+        <p:pic>
+          <p:nvPicPr>
+            <p:cNvPr id="18" name="Picture 6">
+              <a:extLst>
+                <a:ext uri="{FF2B5EF4-FFF2-40B4-BE49-F238E27FC236}">
+                  <a16:creationId xmlns:a16="http://schemas.microsoft.com/office/drawing/2014/main" id="{8ECA689F-E757-E784-F760-853FD0563A49}"/>
+                </a:ext>
+              </a:extLst>
+            </p:cNvPr>
+            <p:cNvPicPr>
+              <a:picLocks noChangeAspect="1"/>
+            </p:cNvPicPr>
+            <p:nvPr/>
+          </p:nvPicPr>
+          <p:blipFill>
+            <a:blip r:embed="rId3"/>
+            <a:stretch>
+              <a:fillRect/>
+            </a:stretch>
+          </p:blipFill>
+          <p:spPr>
+            <a:xfrm>
+              <a:off x="1818532" y="2445822"/>
+              <a:ext cx="281792" cy="254330"/>
+            </a:xfrm>
+            <a:prstGeom prst="rect">
+              <a:avLst/>
+            </a:prstGeom>
+          </p:spPr>
+        </p:pic>
+        <p:sp>
+          <p:nvSpPr>
+            <p:cNvPr id="19" name="TextBox 20">
+              <a:extLst>
+                <a:ext uri="{FF2B5EF4-FFF2-40B4-BE49-F238E27FC236}">
+                  <a16:creationId xmlns:a16="http://schemas.microsoft.com/office/drawing/2014/main" id="{5F635A74-BA1F-4F8D-D25A-C8B06303A668}"/>
+                </a:ext>
+              </a:extLst>
+            </p:cNvPr>
+            <p:cNvSpPr txBox="1"/>
+            <p:nvPr/>
+          </p:nvSpPr>
+          <p:spPr>
+            <a:xfrm>
+              <a:off x="2384961" y="2414648"/>
+              <a:ext cx="6195607" cy="312330"/>
+            </a:xfrm>
+            <a:prstGeom prst="rect">
+              <a:avLst/>
+            </a:prstGeom>
+            <a:solidFill>
+              <a:schemeClr val="bg1"/>
+            </a:solidFill>
+          </p:spPr>
+          <p:txBody>
+            <a:bodyPr rot="0" spcFirstLastPara="0" vertOverflow="overflow" horzOverflow="overflow" vert="horz" wrap="none" lIns="0" tIns="0" rIns="0" bIns="0" numCol="1" spcCol="0" rtlCol="0" fromWordArt="0" anchor="t" anchorCtr="0" forceAA="0" compatLnSpc="1">
+              <a:prstTxWarp prst="textNoShape">
+                <a:avLst/>
+              </a:prstTxWarp>
+              <a:spAutoFit/>
+            </a:bodyPr>
+            <a:lstStyle/>
+            <a:p>
+              <a:pPr>
+                <a:lnSpc>
+                  <a:spcPct val="110000"/>
+                </a:lnSpc>
+                <a:spcAft>
+                  <a:spcPts val="200"/>
+                </a:spcAft>
+              </a:pPr>
+              <a:r>
+                <a:rPr lang="en-US" sz="2000" dirty="0">
+                  <a:solidFill>
+                    <a:schemeClr val="bg1">
+                      <a:lumMod val="50000"/>
+                    </a:schemeClr>
+                  </a:solidFill>
+                  <a:latin typeface="Arial"/>
+                  <a:cs typeface="Arial"/>
+                </a:rPr>
+                <a:t>Extend our already existing model code with all of that</a:t>
+              </a:r>
+              <a:endParaRPr lang="en-US" sz="2000" dirty="0">
+                <a:solidFill>
+                  <a:schemeClr val="bg1">
+                    <a:lumMod val="50000"/>
+                  </a:schemeClr>
+                </a:solidFill>
+                <a:cs typeface="Arial"/>
+              </a:endParaRPr>
+            </a:p>
+          </p:txBody>
+        </p:sp>
+      </p:grpSp>
     </p:spTree>
     <p:extLst>
       <p:ext uri="{BB962C8B-B14F-4D97-AF65-F5344CB8AC3E}">
@@ -10534,11 +11099,17 @@
 
 <file path=ppt/tags/tag1.xml><?xml version="1.0" encoding="utf-8"?>
 <p:tagLst xmlns:a="http://schemas.openxmlformats.org/drawingml/2006/main" xmlns:r="http://schemas.openxmlformats.org/officeDocument/2006/relationships" xmlns:p="http://schemas.openxmlformats.org/presentationml/2006/main">
+  <p:tag name="MIO_VERSION" val="19.03.2021 08:43:36"/>
+</p:tagLst>
+</file>
+
+<file path=ppt/tags/tag10.xml><?xml version="1.0" encoding="utf-8"?>
+<p:tagLst xmlns:a="http://schemas.openxmlformats.org/drawingml/2006/main" xmlns:r="http://schemas.openxmlformats.org/officeDocument/2006/relationships" xmlns:p="http://schemas.openxmlformats.org/presentationml/2006/main">
   <p:tag name="MIO_SKIP_CDCHECK" val="True"/>
 </p:tagLst>
 </file>
 
-<file path=ppt/tags/tag10.xml><?xml version="1.0" encoding="utf-8"?>
+<file path=ppt/tags/tag11.xml><?xml version="1.0" encoding="utf-8"?>
 <p:tagLst xmlns:a="http://schemas.openxmlformats.org/drawingml/2006/main" xmlns:r="http://schemas.openxmlformats.org/officeDocument/2006/relationships" xmlns:p="http://schemas.openxmlformats.org/presentationml/2006/main">
   <p:tag name="MIO_SKIP_CDCHECK" val="True"/>
 </p:tagLst>
@@ -10551,6 +11122,12 @@
 </file>
 
 <file path=ppt/tags/tag3.xml><?xml version="1.0" encoding="utf-8"?>
+<p:tagLst xmlns:a="http://schemas.openxmlformats.org/drawingml/2006/main" xmlns:r="http://schemas.openxmlformats.org/officeDocument/2006/relationships" xmlns:p="http://schemas.openxmlformats.org/presentationml/2006/main">
+  <p:tag name="MIO_SKIP_CDCHECK" val="True"/>
+</p:tagLst>
+</file>
+
+<file path=ppt/tags/tag4.xml><?xml version="1.0" encoding="utf-8"?>
 <p:tagLst xmlns:a="http://schemas.openxmlformats.org/drawingml/2006/main" xmlns:r="http://schemas.openxmlformats.org/officeDocument/2006/relationships" xmlns:p="http://schemas.openxmlformats.org/presentationml/2006/main">
   <p:tag name="MIO_HDS" val="True"/>
   <p:tag name="MIO_EKGUID" val="03c2b9a4-b3f1-4270-a1c3-ce026163b2c0"/>
@@ -10568,12 +11145,6 @@
   <p:tag name="MIO_SKIPVERSION" val="01.01.0001 00:00:00"/>
   <p:tag name="MIO_LASTDOWNLOADED" val="26.04.2023 19:58:06.795"/>
   <p:tag name="MIO_CDID" val="70b1a660-c825-45a0-835a-999e700cb5de"/>
-</p:tagLst>
-</file>
-
-<file path=ppt/tags/tag4.xml><?xml version="1.0" encoding="utf-8"?>
-<p:tagLst xmlns:a="http://schemas.openxmlformats.org/drawingml/2006/main" xmlns:r="http://schemas.openxmlformats.org/officeDocument/2006/relationships" xmlns:p="http://schemas.openxmlformats.org/presentationml/2006/main">
-  <p:tag name="MIO_SKIP_CDCHECK" val="True"/>
 </p:tagLst>
 </file>
 
@@ -10597,6 +11168,12 @@
 
 <file path=ppt/tags/tag8.xml><?xml version="1.0" encoding="utf-8"?>
 <p:tagLst xmlns:a="http://schemas.openxmlformats.org/drawingml/2006/main" xmlns:r="http://schemas.openxmlformats.org/officeDocument/2006/relationships" xmlns:p="http://schemas.openxmlformats.org/presentationml/2006/main">
+  <p:tag name="MIO_SKIP_CDCHECK" val="True"/>
+</p:tagLst>
+</file>
+
+<file path=ppt/tags/tag9.xml><?xml version="1.0" encoding="utf-8"?>
+<p:tagLst xmlns:a="http://schemas.openxmlformats.org/drawingml/2006/main" xmlns:r="http://schemas.openxmlformats.org/officeDocument/2006/relationships" xmlns:p="http://schemas.openxmlformats.org/presentationml/2006/main">
   <p:tag name="MIO_FALLBACK_LAYOUT" val="4"/>
   <p:tag name="MIO_SHOW_DATE" val="False"/>
   <p:tag name="MIO_SHOW_FOOTER" val="False"/>
@@ -10613,12 +11190,6 @@
   <p:tag name="MIO_LASTDOWNLOADED" val="15.10.2021 14:46:37.684"/>
   <p:tag name="MIO_OBJECTNAME" val="Alexander Thamm 16:9"/>
   <p:tag name="MIO_CDID" val="70b1a660-c825-45a0-835a-999e700cb5de"/>
-</p:tagLst>
-</file>
-
-<file path=ppt/tags/tag9.xml><?xml version="1.0" encoding="utf-8"?>
-<p:tagLst xmlns:a="http://schemas.openxmlformats.org/drawingml/2006/main" xmlns:r="http://schemas.openxmlformats.org/officeDocument/2006/relationships" xmlns:p="http://schemas.openxmlformats.org/presentationml/2006/main">
-  <p:tag name="MIO_SKIP_CDCHECK" val="True"/>
 </p:tagLst>
 </file>
 
@@ -11861,26 +12432,6 @@
 </file>
 
 <file path=customXml/item1.xml><?xml version="1.0" encoding="utf-8"?>
-<?mso-contentType ?>
-<FormTemplates xmlns="http://schemas.microsoft.com/sharepoint/v3/contenttype/forms">
-  <Display>DocumentLibraryForm</Display>
-  <Edit>DocumentLibraryForm</Edit>
-  <New>DocumentLibraryForm</New>
-</FormTemplates>
-</file>
-
-<file path=customXml/item2.xml><?xml version="1.0" encoding="utf-8"?>
-<p:properties xmlns:p="http://schemas.microsoft.com/office/2006/metadata/properties" xmlns:xsi="http://www.w3.org/2001/XMLSchema-instance" xmlns:pc="http://schemas.microsoft.com/office/infopath/2007/PartnerControls">
-  <documentManagement>
-    <lcf76f155ced4ddcb4097134ff3c332f xmlns="3ee696de-6404-4f80-a556-9e3640bd0ae6">
-      <Terms xmlns="http://schemas.microsoft.com/office/infopath/2007/PartnerControls"/>
-    </lcf76f155ced4ddcb4097134ff3c332f>
-    <TaxCatchAll xmlns="edf5e542-04b7-4362-adf0-44108a2c95a0" xsi:nil="true"/>
-  </documentManagement>
-</p:properties>
-</file>
-
-<file path=customXml/item3.xml><?xml version="1.0" encoding="utf-8"?>
 <ct:contentTypeSchema xmlns:ct="http://schemas.microsoft.com/office/2006/metadata/contentType" xmlns:ma="http://schemas.microsoft.com/office/2006/metadata/properties/metaAttributes" ct:_="" ma:_="" ma:contentTypeName="Dokument" ma:contentTypeID="0x0101003C1233DCEB11E04C8368BF7F3B3A09F3" ma:contentTypeVersion="11" ma:contentTypeDescription="Ein neues Dokument erstellen." ma:contentTypeScope="" ma:versionID="10db06916635317c31f8ed850175d36e">
   <xsd:schema xmlns:xsd="http://www.w3.org/2001/XMLSchema" xmlns:xs="http://www.w3.org/2001/XMLSchema" xmlns:p="http://schemas.microsoft.com/office/2006/metadata/properties" xmlns:ns2="3ee696de-6404-4f80-a556-9e3640bd0ae6" xmlns:ns3="edf5e542-04b7-4362-adf0-44108a2c95a0" targetNamespace="http://schemas.microsoft.com/office/2006/metadata/properties" ma:root="true" ma:fieldsID="d83804047543ae5774c261aac83989ea" ns2:_="" ns3:_="">
     <xsd:import namespace="3ee696de-6404-4f80-a556-9e3640bd0ae6"/>
@@ -12091,10 +12642,41 @@
 </ct:contentTypeSchema>
 </file>
 
+<file path=customXml/item2.xml><?xml version="1.0" encoding="utf-8"?>
+<p:properties xmlns:p="http://schemas.microsoft.com/office/2006/metadata/properties" xmlns:xsi="http://www.w3.org/2001/XMLSchema-instance" xmlns:pc="http://schemas.microsoft.com/office/infopath/2007/PartnerControls">
+  <documentManagement>
+    <lcf76f155ced4ddcb4097134ff3c332f xmlns="3ee696de-6404-4f80-a556-9e3640bd0ae6">
+      <Terms xmlns="http://schemas.microsoft.com/office/infopath/2007/PartnerControls"/>
+    </lcf76f155ced4ddcb4097134ff3c332f>
+    <TaxCatchAll xmlns="edf5e542-04b7-4362-adf0-44108a2c95a0" xsi:nil="true"/>
+  </documentManagement>
+</p:properties>
+</file>
+
+<file path=customXml/item3.xml><?xml version="1.0" encoding="utf-8"?>
+<?mso-contentType ?>
+<FormTemplates xmlns="http://schemas.microsoft.com/sharepoint/v3/contenttype/forms">
+  <Display>DocumentLibraryForm</Display>
+  <Edit>DocumentLibraryForm</Edit>
+  <New>DocumentLibraryForm</New>
+</FormTemplates>
+</file>
+
 <file path=customXml/itemProps1.xml><?xml version="1.0" encoding="utf-8"?>
-<ds:datastoreItem xmlns:ds="http://schemas.openxmlformats.org/officeDocument/2006/customXml" ds:itemID="{202FBA30-76D6-4BC4-84F4-27E58F7BD014}">
+<ds:datastoreItem xmlns:ds="http://schemas.openxmlformats.org/officeDocument/2006/customXml" ds:itemID="{6B29869C-2685-4F7F-88E7-20FA8EDA3B16}">
   <ds:schemaRefs>
-    <ds:schemaRef ds:uri="http://schemas.microsoft.com/sharepoint/v3/contenttype/forms"/>
+    <ds:schemaRef ds:uri="http://schemas.microsoft.com/office/2006/metadata/contentType"/>
+    <ds:schemaRef ds:uri="http://schemas.microsoft.com/office/2006/metadata/properties/metaAttributes"/>
+    <ds:schemaRef ds:uri="http://www.w3.org/2001/XMLSchema"/>
+    <ds:schemaRef ds:uri="http://schemas.microsoft.com/office/2006/metadata/properties"/>
+    <ds:schemaRef ds:uri="3ee696de-6404-4f80-a556-9e3640bd0ae6"/>
+    <ds:schemaRef ds:uri="edf5e542-04b7-4362-adf0-44108a2c95a0"/>
+    <ds:schemaRef ds:uri="http://schemas.microsoft.com/office/2006/documentManagement/types"/>
+    <ds:schemaRef ds:uri="http://schemas.microsoft.com/office/infopath/2007/PartnerControls"/>
+    <ds:schemaRef ds:uri="http://schemas.openxmlformats.org/package/2006/metadata/core-properties"/>
+    <ds:schemaRef ds:uri="http://purl.org/dc/elements/1.1/"/>
+    <ds:schemaRef ds:uri="http://purl.org/dc/terms/"/>
+    <ds:schemaRef ds:uri="http://schemas.microsoft.com/internal/obd"/>
   </ds:schemaRefs>
 </ds:datastoreItem>
 </file>
@@ -12111,20 +12693,9 @@
 </file>
 
 <file path=customXml/itemProps3.xml><?xml version="1.0" encoding="utf-8"?>
-<ds:datastoreItem xmlns:ds="http://schemas.openxmlformats.org/officeDocument/2006/customXml" ds:itemID="{6B29869C-2685-4F7F-88E7-20FA8EDA3B16}">
+<ds:datastoreItem xmlns:ds="http://schemas.openxmlformats.org/officeDocument/2006/customXml" ds:itemID="{202FBA30-76D6-4BC4-84F4-27E58F7BD014}">
   <ds:schemaRefs>
-    <ds:schemaRef ds:uri="http://schemas.microsoft.com/office/2006/metadata/contentType"/>
-    <ds:schemaRef ds:uri="http://schemas.microsoft.com/office/2006/metadata/properties/metaAttributes"/>
-    <ds:schemaRef ds:uri="http://www.w3.org/2001/XMLSchema"/>
-    <ds:schemaRef ds:uri="http://schemas.microsoft.com/office/2006/metadata/properties"/>
-    <ds:schemaRef ds:uri="3ee696de-6404-4f80-a556-9e3640bd0ae6"/>
-    <ds:schemaRef ds:uri="edf5e542-04b7-4362-adf0-44108a2c95a0"/>
-    <ds:schemaRef ds:uri="http://schemas.microsoft.com/office/2006/documentManagement/types"/>
-    <ds:schemaRef ds:uri="http://schemas.microsoft.com/office/infopath/2007/PartnerControls"/>
-    <ds:schemaRef ds:uri="http://schemas.openxmlformats.org/package/2006/metadata/core-properties"/>
-    <ds:schemaRef ds:uri="http://purl.org/dc/elements/1.1/"/>
-    <ds:schemaRef ds:uri="http://purl.org/dc/terms/"/>
-    <ds:schemaRef ds:uri="http://schemas.microsoft.com/internal/obd"/>
+    <ds:schemaRef ds:uri="http://schemas.microsoft.com/sharepoint/v3/contenttype/forms"/>
   </ds:schemaRefs>
 </ds:datastoreItem>
 </file>
</xml_diff>